<commit_message>
presentation, pdf and zip
</commit_message>
<xml_diff>
--- a/Parallel Data Mining.pptx
+++ b/Parallel Data Mining.pptx
@@ -11573,6 +11573,65 @@
           </a:p>
         </p:txBody>
       </p:sp>
+      <p:sp>
+        <p:nvSpPr>
+          <p:cNvPr id="4" name="TextBox 3">
+            <a:extLst>
+              <a:ext uri="{FF2B5EF4-FFF2-40B4-BE49-F238E27FC236}">
+                <a16:creationId xmlns:a16="http://schemas.microsoft.com/office/drawing/2014/main" id="{BBA2D1EF-E9BB-4C87-832D-DB6EDAC8FAE0}"/>
+              </a:ext>
+            </a:extLst>
+          </p:cNvPr>
+          <p:cNvSpPr txBox="1"/>
+          <p:nvPr/>
+        </p:nvSpPr>
+        <p:spPr>
+          <a:xfrm>
+            <a:off x="0" y="6116923"/>
+            <a:ext cx="1630271" cy="677108"/>
+          </a:xfrm>
+          <a:prstGeom prst="rect">
+            <a:avLst/>
+          </a:prstGeom>
+          <a:noFill/>
+        </p:spPr>
+        <p:txBody>
+          <a:bodyPr wrap="square" rtlCol="0">
+            <a:spAutoFit/>
+          </a:bodyPr>
+          <a:lstStyle/>
+          <a:p>
+            <a:r>
+              <a:rPr lang="en-US" sz="1200" dirty="0"/>
+              <a:t>Omer Tal</a:t>
+            </a:r>
+          </a:p>
+          <a:p>
+            <a:r>
+              <a:rPr lang="en-US" sz="1200" dirty="0"/>
+              <a:t>Elizabeth </a:t>
+            </a:r>
+            <a:r>
+              <a:rPr lang="en-US" sz="1400" dirty="0"/>
+              <a:t>Gorbonos</a:t>
+            </a:r>
+            <a:r>
+              <a:rPr lang="en-US" sz="1200" dirty="0"/>
+              <a:t> </a:t>
+            </a:r>
+          </a:p>
+          <a:p>
+            <a:r>
+              <a:rPr lang="en-US" sz="1200" dirty="0" err="1"/>
+              <a:t>Tianran</a:t>
+            </a:r>
+            <a:r>
+              <a:rPr lang="en-US" sz="1200" dirty="0"/>
+              <a:t> Wang</a:t>
+            </a:r>
+          </a:p>
+        </p:txBody>
+      </p:sp>
     </p:spTree>
     <p:extLst>
       <p:ext uri="{BB962C8B-B14F-4D97-AF65-F5344CB8AC3E}">
@@ -13943,8 +14002,8 @@
           </a:p>
         </p:txBody>
       </p:sp>
-      <mc:AlternateContent xmlns:mc="http://schemas.openxmlformats.org/markup-compatibility/2006">
-        <mc:Choice xmlns:a14="http://schemas.microsoft.com/office/drawing/2010/main" Requires="a14">
+      <mc:AlternateContent xmlns:mc="http://schemas.openxmlformats.org/markup-compatibility/2006" xmlns:a14="http://schemas.microsoft.com/office/drawing/2010/main">
+        <mc:Choice Requires="a14">
           <p:sp>
             <p:nvSpPr>
               <p:cNvPr id="3" name="Content Placeholder 2">
@@ -14048,7 +14107,7 @@
                         <m:begChr m:val="{"/>
                         <m:endChr m:val="}"/>
                         <m:ctrlPr>
-                          <a:rPr lang="en-US" sz="1800" b="0" i="0" smtClean="0">
+                          <a:rPr lang="en-US" sz="1800" b="0" i="1" smtClean="0">
                             <a:latin typeface="Cambria Math" panose="02040503050406030204" pitchFamily="18" charset="0"/>
                           </a:rPr>
                         </m:ctrlPr>
@@ -14229,7 +14288,7 @@
             </p:txBody>
           </p:sp>
         </mc:Choice>
-        <mc:Fallback>
+        <mc:Fallback xmlns="">
           <p:sp>
             <p:nvSpPr>
               <p:cNvPr id="3" name="Content Placeholder 2">
@@ -14583,7 +14642,7 @@
             <a:graphicData uri="http://schemas.openxmlformats.org/presentationml/2006/ole">
               <mc:AlternateContent xmlns:mc="http://schemas.openxmlformats.org/markup-compatibility/2006">
                 <mc:Choice xmlns:v="urn:schemas-microsoft-com:vml" Requires="v">
-                  <p:oleObj spid="_x0000_s1082" name="Worksheet" r:id="rId3" imgW="1619701" imgH="2086337" progId="Excel.Sheet.8">
+                  <p:oleObj spid="_x0000_s1106" name="Worksheet" r:id="rId3" imgW="1619701" imgH="2086337" progId="Excel.Sheet.8">
                     <p:embed/>
                   </p:oleObj>
                 </mc:Choice>
@@ -14789,7 +14848,7 @@
             <a:graphicData uri="http://schemas.openxmlformats.org/presentationml/2006/ole">
               <mc:AlternateContent xmlns:mc="http://schemas.openxmlformats.org/markup-compatibility/2006">
                 <mc:Choice xmlns:v="urn:schemas-microsoft-com:vml" Requires="v">
-                  <p:oleObj spid="_x0000_s1083" name="Worksheet" r:id="rId5" imgW="1619701" imgH="1743437" progId="Excel.Sheet.8">
+                  <p:oleObj spid="_x0000_s1107" name="Worksheet" r:id="rId5" imgW="1619701" imgH="1743437" progId="Excel.Sheet.8">
                     <p:embed/>
                   </p:oleObj>
                 </mc:Choice>
@@ -14995,7 +15054,7 @@
             <a:graphicData uri="http://schemas.openxmlformats.org/presentationml/2006/ole">
               <mc:AlternateContent xmlns:mc="http://schemas.openxmlformats.org/markup-compatibility/2006">
                 <mc:Choice xmlns:v="urn:schemas-microsoft-com:vml" Requires="v">
-                  <p:oleObj spid="_x0000_s1084" name="Worksheet" r:id="rId7" imgW="1581421" imgH="1743437" progId="Excel.Sheet.8">
+                  <p:oleObj spid="_x0000_s1108" name="Worksheet" r:id="rId7" imgW="1581421" imgH="1743437" progId="Excel.Sheet.8">
                     <p:embed/>
                   </p:oleObj>
                 </mc:Choice>
@@ -15201,7 +15260,7 @@
             <a:graphicData uri="http://schemas.openxmlformats.org/presentationml/2006/ole">
               <mc:AlternateContent xmlns:mc="http://schemas.openxmlformats.org/markup-compatibility/2006">
                 <mc:Choice xmlns:v="urn:schemas-microsoft-com:vml" Requires="v">
-                  <p:oleObj spid="_x0000_s1085" name="Worksheet" r:id="rId9" imgW="1581421" imgH="2429237" progId="Excel.Sheet.8">
+                  <p:oleObj spid="_x0000_s1109" name="Worksheet" r:id="rId9" imgW="1581421" imgH="2429237" progId="Excel.Sheet.8">
                     <p:embed/>
                   </p:oleObj>
                 </mc:Choice>
@@ -15407,7 +15466,7 @@
             <a:graphicData uri="http://schemas.openxmlformats.org/presentationml/2006/ole">
               <mc:AlternateContent xmlns:mc="http://schemas.openxmlformats.org/markup-compatibility/2006">
                 <mc:Choice xmlns:v="urn:schemas-microsoft-com:vml" Requires="v">
-                  <p:oleObj spid="_x0000_s1086" name="Worksheet" r:id="rId11" imgW="990961" imgH="2429237" progId="Excel.Sheet.8">
+                  <p:oleObj spid="_x0000_s1110" name="Worksheet" r:id="rId11" imgW="990961" imgH="2429237" progId="Excel.Sheet.8">
                     <p:embed/>
                   </p:oleObj>
                 </mc:Choice>
@@ -15905,7 +15964,7 @@
             <a:graphicData uri="http://schemas.openxmlformats.org/presentationml/2006/ole">
               <mc:AlternateContent xmlns:mc="http://schemas.openxmlformats.org/markup-compatibility/2006">
                 <mc:Choice xmlns:v="urn:schemas-microsoft-com:vml" Requires="v">
-                  <p:oleObj spid="_x0000_s1087" name="Worksheet" r:id="rId13" imgW="990961" imgH="714737" progId="Excel.Sheet.8">
+                  <p:oleObj spid="_x0000_s1111" name="Worksheet" r:id="rId13" imgW="990961" imgH="714737" progId="Excel.Sheet.8">
                     <p:embed/>
                   </p:oleObj>
                 </mc:Choice>
@@ -16265,7 +16324,7 @@
             <a:graphicData uri="http://schemas.openxmlformats.org/presentationml/2006/ole">
               <mc:AlternateContent xmlns:mc="http://schemas.openxmlformats.org/markup-compatibility/2006">
                 <mc:Choice xmlns:v="urn:schemas-microsoft-com:vml" Requires="v">
-                  <p:oleObj spid="_x0000_s1088" name="Worksheet" r:id="rId15" imgW="1581421" imgH="705332" progId="Excel.Sheet.8">
+                  <p:oleObj spid="_x0000_s1112" name="Worksheet" r:id="rId15" imgW="1581421" imgH="705332" progId="Excel.Sheet.8">
                     <p:embed/>
                   </p:oleObj>
                 </mc:Choice>
@@ -16571,7 +16630,7 @@
             <a:graphicData uri="http://schemas.openxmlformats.org/presentationml/2006/ole">
               <mc:AlternateContent xmlns:mc="http://schemas.openxmlformats.org/markup-compatibility/2006">
                 <mc:Choice xmlns:v="urn:schemas-microsoft-com:vml" Requires="v">
-                  <p:oleObj spid="_x0000_s1089" name="Worksheet" r:id="rId17" imgW="1667372" imgH="1743437" progId="Excel.Sheet.8">
+                  <p:oleObj spid="_x0000_s1113" name="Worksheet" r:id="rId17" imgW="1667372" imgH="1743437" progId="Excel.Sheet.8">
                     <p:embed/>
                   </p:oleObj>
                 </mc:Choice>
@@ -17732,8 +17791,8 @@
           </a:p>
         </p:txBody>
       </p:sp>
-      <mc:AlternateContent xmlns:mc="http://schemas.openxmlformats.org/markup-compatibility/2006">
-        <mc:Choice xmlns:a14="http://schemas.microsoft.com/office/drawing/2010/main" Requires="a14">
+      <mc:AlternateContent xmlns:mc="http://schemas.openxmlformats.org/markup-compatibility/2006" xmlns:a14="http://schemas.microsoft.com/office/drawing/2010/main">
+        <mc:Choice Requires="a14">
           <p:sp>
             <p:nvSpPr>
               <p:cNvPr id="3" name="Content Placeholder 2">
@@ -17886,7 +17945,7 @@
             </p:txBody>
           </p:sp>
         </mc:Choice>
-        <mc:Fallback>
+        <mc:Fallback xmlns="">
           <p:sp>
             <p:nvSpPr>
               <p:cNvPr id="3" name="Content Placeholder 2">
@@ -18229,6 +18288,24 @@
           <a:p>
             <a:r>
               <a:rPr lang="en-US" dirty="0"/>
+              <a:t>All counting results are gathered in process 0 </a:t>
+            </a:r>
+          </a:p>
+          <a:p>
+            <a:r>
+              <a:rPr lang="en-US" dirty="0"/>
+              <a:t>Process 0 generates the next level candidates, build the candidate tree and broadcasts it.</a:t>
+            </a:r>
+          </a:p>
+          <a:p>
+            <a:r>
+              <a:rPr lang="en-US" dirty="0"/>
+              <a:t>The iterations come to an end when an END signal is broadcasted.</a:t>
+            </a:r>
+          </a:p>
+          <a:p>
+            <a:r>
+              <a:rPr lang="en-US" dirty="0"/>
               <a:t>Rules generation remained serial -  took on average 0.01s</a:t>
             </a:r>
           </a:p>
@@ -18317,7 +18394,7 @@
               <a:p>
                 <a:r>
                   <a:rPr lang="en-US" dirty="0"/>
-                  <a:t>Each processor own a section of the transactions </a:t>
+                  <a:t>Each processor owns a section of the transactions </a:t>
                 </a:r>
               </a:p>
               <a:p>
@@ -18333,24 +18410,32 @@
                     <m:sSub>
                       <m:sSubPr>
                         <m:ctrlPr>
-                          <a:rPr lang="en-US" i="1"/>
+                          <a:rPr lang="en-US" i="1">
+                            <a:latin typeface="Cambria Math" panose="02040503050406030204" pitchFamily="18" charset="0"/>
+                          </a:rPr>
                         </m:ctrlPr>
                       </m:sSubPr>
                       <m:e>
                         <m:r>
-                          <a:rPr lang="en-US" i="1"/>
+                          <a:rPr lang="en-US" i="1">
+                            <a:latin typeface="Cambria Math" panose="02040503050406030204" pitchFamily="18" charset="0"/>
+                          </a:rPr>
                           <m:t>𝑛</m:t>
                         </m:r>
                       </m:e>
                       <m:sub>
                         <m:r>
-                          <a:rPr lang="en-US" i="1"/>
+                          <a:rPr lang="en-US" i="1">
+                            <a:latin typeface="Cambria Math" panose="02040503050406030204" pitchFamily="18" charset="0"/>
+                          </a:rPr>
                           <m:t>𝑝</m:t>
                         </m:r>
                       </m:sub>
                     </m:sSub>
                     <m:r>
-                      <a:rPr lang="en-US" i="1"/>
+                      <a:rPr lang="en-US" i="1">
+                        <a:latin typeface="Cambria Math" panose="02040503050406030204" pitchFamily="18" charset="0"/>
+                      </a:rPr>
                       <m:t>= </m:t>
                     </m:r>
                     <m:d>
@@ -18358,25 +18443,33 @@
                         <m:begChr m:val="⌊"/>
                         <m:endChr m:val="⌋"/>
                         <m:ctrlPr>
-                          <a:rPr lang="en-US" i="1"/>
+                          <a:rPr lang="en-US" i="1">
+                            <a:latin typeface="Cambria Math" panose="02040503050406030204" pitchFamily="18" charset="0"/>
+                          </a:rPr>
                         </m:ctrlPr>
                       </m:dPr>
                       <m:e>
                         <m:f>
                           <m:fPr>
                             <m:ctrlPr>
-                              <a:rPr lang="en-US" i="1"/>
+                              <a:rPr lang="en-US" i="1">
+                                <a:latin typeface="Cambria Math" panose="02040503050406030204" pitchFamily="18" charset="0"/>
+                              </a:rPr>
                             </m:ctrlPr>
                           </m:fPr>
                           <m:num>
                             <m:r>
-                              <a:rPr lang="en-US" i="1"/>
+                              <a:rPr lang="en-US" i="1">
+                                <a:latin typeface="Cambria Math" panose="02040503050406030204" pitchFamily="18" charset="0"/>
+                              </a:rPr>
                               <m:t>𝑛</m:t>
                             </m:r>
                           </m:num>
                           <m:den>
                             <m:r>
-                              <a:rPr lang="en-US" i="1"/>
+                              <a:rPr lang="en-US" i="1">
+                                <a:latin typeface="Cambria Math" panose="02040503050406030204" pitchFamily="18" charset="0"/>
+                              </a:rPr>
                               <m:t>𝑃</m:t>
                             </m:r>
                           </m:den>
@@ -18384,7 +18477,9 @@
                       </m:e>
                     </m:d>
                     <m:r>
-                      <a:rPr lang="en-US" i="1"/>
+                      <a:rPr lang="en-US" i="1">
+                        <a:latin typeface="Cambria Math" panose="02040503050406030204" pitchFamily="18" charset="0"/>
+                      </a:rPr>
                       <m:t>+</m:t>
                     </m:r>
                     <m:d>
@@ -18392,7 +18487,9 @@
                         <m:begChr m:val="{"/>
                         <m:endChr m:val=""/>
                         <m:ctrlPr>
-                          <a:rPr lang="en-US" i="1"/>
+                          <a:rPr lang="en-US" i="1">
+                            <a:latin typeface="Cambria Math" panose="02040503050406030204" pitchFamily="18" charset="0"/>
+                          </a:rPr>
                         </m:ctrlPr>
                       </m:dPr>
                       <m:e>
@@ -18407,57 +18504,83 @@
                               </m:mc>
                             </m:mcs>
                             <m:ctrlPr>
-                              <a:rPr lang="en-US" i="1"/>
+                              <a:rPr lang="en-US" i="1">
+                                <a:latin typeface="Cambria Math" panose="02040503050406030204" pitchFamily="18" charset="0"/>
+                              </a:rPr>
                             </m:ctrlPr>
                           </m:mPr>
                           <m:mr>
                             <m:e>
                               <m:r>
-                                <a:rPr lang="en-US" i="1"/>
+                                <a:rPr lang="en-US" i="1">
+                                  <a:latin typeface="Cambria Math" panose="02040503050406030204" pitchFamily="18" charset="0"/>
+                                </a:rPr>
                                 <m:t>1</m:t>
                               </m:r>
                               <m:r>
-                                <a:rPr lang="en-US" i="1"/>
+                                <a:rPr lang="en-US" i="1">
+                                  <a:latin typeface="Cambria Math" panose="02040503050406030204" pitchFamily="18" charset="0"/>
+                                </a:rPr>
                                 <m:t>  </m:t>
                               </m:r>
                               <m:r>
-                                <a:rPr lang="en-US" i="1"/>
+                                <a:rPr lang="en-US" i="1">
+                                  <a:latin typeface="Cambria Math" panose="02040503050406030204" pitchFamily="18" charset="0"/>
+                                </a:rPr>
                                 <m:t>𝑖𝑓</m:t>
                               </m:r>
                               <m:r>
-                                <a:rPr lang="en-US" i="1"/>
+                                <a:rPr lang="en-US" i="1">
+                                  <a:latin typeface="Cambria Math" panose="02040503050406030204" pitchFamily="18" charset="0"/>
+                                </a:rPr>
                                 <m:t> </m:t>
                               </m:r>
                               <m:r>
-                                <a:rPr lang="en-US" i="1"/>
+                                <a:rPr lang="en-US" i="1">
+                                  <a:latin typeface="Cambria Math" panose="02040503050406030204" pitchFamily="18" charset="0"/>
+                                </a:rPr>
                                 <m:t>𝑝</m:t>
                               </m:r>
                               <m:r>
-                                <a:rPr lang="en-US" i="1"/>
+                                <a:rPr lang="en-US" i="1">
+                                  <a:latin typeface="Cambria Math" panose="02040503050406030204" pitchFamily="18" charset="0"/>
+                                </a:rPr>
                                 <m:t>&lt;</m:t>
                               </m:r>
                               <m:r>
-                                <a:rPr lang="en-US" i="1"/>
+                                <a:rPr lang="en-US" i="1">
+                                  <a:latin typeface="Cambria Math" panose="02040503050406030204" pitchFamily="18" charset="0"/>
+                                </a:rPr>
                                 <m:t>𝑚𝑜𝑑</m:t>
                               </m:r>
                               <m:r>
-                                <a:rPr lang="en-US" i="1"/>
+                                <a:rPr lang="en-US" i="1">
+                                  <a:latin typeface="Cambria Math" panose="02040503050406030204" pitchFamily="18" charset="0"/>
+                                </a:rPr>
                                 <m:t>(</m:t>
                               </m:r>
                               <m:r>
-                                <a:rPr lang="en-US" i="1"/>
+                                <a:rPr lang="en-US" i="1">
+                                  <a:latin typeface="Cambria Math" panose="02040503050406030204" pitchFamily="18" charset="0"/>
+                                </a:rPr>
                                 <m:t>𝑛</m:t>
                               </m:r>
                               <m:r>
-                                <a:rPr lang="en-US" i="1"/>
+                                <a:rPr lang="en-US" i="1">
+                                  <a:latin typeface="Cambria Math" panose="02040503050406030204" pitchFamily="18" charset="0"/>
+                                </a:rPr>
                                 <m:t>,</m:t>
                               </m:r>
                               <m:r>
-                                <a:rPr lang="en-US" i="1"/>
+                                <a:rPr lang="en-US" i="1">
+                                  <a:latin typeface="Cambria Math" panose="02040503050406030204" pitchFamily="18" charset="0"/>
+                                </a:rPr>
                                 <m:t>𝑃</m:t>
                               </m:r>
                               <m:r>
-                                <a:rPr lang="en-US" i="1"/>
+                                <a:rPr lang="en-US" i="1">
+                                  <a:latin typeface="Cambria Math" panose="02040503050406030204" pitchFamily="18" charset="0"/>
+                                </a:rPr>
                                 <m:t>)</m:t>
                               </m:r>
                             </m:e>
@@ -18465,15 +18588,21 @@
                           <m:mr>
                             <m:e>
                               <m:r>
-                                <a:rPr lang="en-US" i="1"/>
+                                <a:rPr lang="en-US" i="1">
+                                  <a:latin typeface="Cambria Math" panose="02040503050406030204" pitchFamily="18" charset="0"/>
+                                </a:rPr>
                                 <m:t>0</m:t>
                               </m:r>
                               <m:r>
-                                <a:rPr lang="en-US" i="1"/>
+                                <a:rPr lang="en-US" i="1">
+                                  <a:latin typeface="Cambria Math" panose="02040503050406030204" pitchFamily="18" charset="0"/>
+                                </a:rPr>
                                 <m:t> </m:t>
                               </m:r>
                               <m:r>
-                                <a:rPr lang="en-US" i="1"/>
+                                <a:rPr lang="en-US" i="1">
+                                  <a:latin typeface="Cambria Math" panose="02040503050406030204" pitchFamily="18" charset="0"/>
+                                </a:rPr>
                                 <m:t>𝑒𝑙𝑠𝑒</m:t>
                               </m:r>
                             </m:e>
@@ -18492,44 +18621,62 @@
                     <m:sSub>
                       <m:sSubPr>
                         <m:ctrlPr>
-                          <a:rPr lang="en-US" i="1"/>
+                          <a:rPr lang="en-US" i="1">
+                            <a:latin typeface="Cambria Math" panose="02040503050406030204" pitchFamily="18" charset="0"/>
+                          </a:rPr>
                         </m:ctrlPr>
                       </m:sSubPr>
                       <m:e>
                         <m:r>
-                          <a:rPr lang="en-US" i="1"/>
+                          <a:rPr lang="en-US" i="1">
+                            <a:latin typeface="Cambria Math" panose="02040503050406030204" pitchFamily="18" charset="0"/>
+                          </a:rPr>
                           <m:t>𝑖</m:t>
                         </m:r>
                       </m:e>
                       <m:sub>
                         <m:r>
-                          <a:rPr lang="en-US" i="1"/>
+                          <a:rPr lang="en-US" i="1">
+                            <a:latin typeface="Cambria Math" panose="02040503050406030204" pitchFamily="18" charset="0"/>
+                          </a:rPr>
                           <m:t> </m:t>
                         </m:r>
                         <m:r>
-                          <a:rPr lang="en-US" i="1"/>
+                          <a:rPr lang="en-US" i="1">
+                            <a:latin typeface="Cambria Math" panose="02040503050406030204" pitchFamily="18" charset="0"/>
+                          </a:rPr>
                           <m:t>𝑠𝑡𝑎𝑟𝑡</m:t>
                         </m:r>
                         <m:r>
-                          <a:rPr lang="en-US" i="1"/>
+                          <a:rPr lang="en-US" i="1">
+                            <a:latin typeface="Cambria Math" panose="02040503050406030204" pitchFamily="18" charset="0"/>
+                          </a:rPr>
                           <m:t>,</m:t>
                         </m:r>
                         <m:r>
-                          <a:rPr lang="en-US" i="1"/>
+                          <a:rPr lang="en-US" i="1">
+                            <a:latin typeface="Cambria Math" panose="02040503050406030204" pitchFamily="18" charset="0"/>
+                          </a:rPr>
                           <m:t>𝑝</m:t>
                         </m:r>
                       </m:sub>
                     </m:sSub>
                     <m:r>
-                      <a:rPr lang="en-US" i="1"/>
+                      <a:rPr lang="en-US" i="1">
+                        <a:latin typeface="Cambria Math" panose="02040503050406030204" pitchFamily="18" charset="0"/>
+                      </a:rPr>
                       <m:t>= </m:t>
                     </m:r>
                     <m:r>
-                      <a:rPr lang="en-US" i="1"/>
+                      <a:rPr lang="en-US" i="1">
+                        <a:latin typeface="Cambria Math" panose="02040503050406030204" pitchFamily="18" charset="0"/>
+                      </a:rPr>
                       <m:t>𝑝</m:t>
                     </m:r>
                     <m:r>
-                      <a:rPr lang="en-US" i="1"/>
+                      <a:rPr lang="en-US" i="1">
+                        <a:latin typeface="Cambria Math" panose="02040503050406030204" pitchFamily="18" charset="0"/>
+                      </a:rPr>
                       <m:t>∗</m:t>
                     </m:r>
                     <m:d>
@@ -18537,25 +18684,33 @@
                         <m:begChr m:val="⌊"/>
                         <m:endChr m:val="⌋"/>
                         <m:ctrlPr>
-                          <a:rPr lang="en-US" i="1"/>
+                          <a:rPr lang="en-US" i="1">
+                            <a:latin typeface="Cambria Math" panose="02040503050406030204" pitchFamily="18" charset="0"/>
+                          </a:rPr>
                         </m:ctrlPr>
                       </m:dPr>
                       <m:e>
                         <m:f>
                           <m:fPr>
                             <m:ctrlPr>
-                              <a:rPr lang="en-US" i="1"/>
+                              <a:rPr lang="en-US" i="1">
+                                <a:latin typeface="Cambria Math" panose="02040503050406030204" pitchFamily="18" charset="0"/>
+                              </a:rPr>
                             </m:ctrlPr>
                           </m:fPr>
                           <m:num>
                             <m:r>
-                              <a:rPr lang="en-US" i="1"/>
+                              <a:rPr lang="en-US" i="1">
+                                <a:latin typeface="Cambria Math" panose="02040503050406030204" pitchFamily="18" charset="0"/>
+                              </a:rPr>
                               <m:t>𝑛</m:t>
                             </m:r>
                           </m:num>
                           <m:den>
                             <m:r>
-                              <a:rPr lang="en-US" i="1"/>
+                              <a:rPr lang="en-US" i="1">
+                                <a:latin typeface="Cambria Math" panose="02040503050406030204" pitchFamily="18" charset="0"/>
+                              </a:rPr>
                               <m:t>𝑃</m:t>
                             </m:r>
                           </m:den>
@@ -18563,11 +18718,15 @@
                       </m:e>
                     </m:d>
                     <m:r>
-                      <a:rPr lang="en-US" i="1"/>
+                      <a:rPr lang="en-US" i="1">
+                        <a:latin typeface="Cambria Math" panose="02040503050406030204" pitchFamily="18" charset="0"/>
+                      </a:rPr>
                       <m:t>+</m:t>
                     </m:r>
                     <m:r>
-                      <a:rPr lang="en-US" i="1"/>
+                      <a:rPr lang="en-US" i="1">
+                        <a:latin typeface="Cambria Math" panose="02040503050406030204" pitchFamily="18" charset="0"/>
+                      </a:rPr>
                       <m:t>𝑚𝑖𝑛</m:t>
                     </m:r>
                     <m:d>
@@ -18580,34 +18739,48 @@
                       </m:dPr>
                       <m:e>
                         <m:r>
-                          <a:rPr lang="en-US" i="1"/>
+                          <a:rPr lang="en-US" i="1">
+                            <a:latin typeface="Cambria Math" panose="02040503050406030204" pitchFamily="18" charset="0"/>
+                          </a:rPr>
                           <m:t>𝑝</m:t>
                         </m:r>
                         <m:r>
-                          <a:rPr lang="en-US" i="1"/>
+                          <a:rPr lang="en-US" i="1">
+                            <a:latin typeface="Cambria Math" panose="02040503050406030204" pitchFamily="18" charset="0"/>
+                          </a:rPr>
                           <m:t>,</m:t>
                         </m:r>
                         <m:r>
-                          <a:rPr lang="en-US" i="1"/>
+                          <a:rPr lang="en-US" i="1">
+                            <a:latin typeface="Cambria Math" panose="02040503050406030204" pitchFamily="18" charset="0"/>
+                          </a:rPr>
                           <m:t>𝑚𝑜𝑑</m:t>
                         </m:r>
                         <m:d>
                           <m:dPr>
                             <m:ctrlPr>
-                              <a:rPr lang="en-US" i="1"/>
+                              <a:rPr lang="en-US" i="1">
+                                <a:latin typeface="Cambria Math" panose="02040503050406030204" pitchFamily="18" charset="0"/>
+                              </a:rPr>
                             </m:ctrlPr>
                           </m:dPr>
                           <m:e>
                             <m:r>
-                              <a:rPr lang="en-US" i="1"/>
+                              <a:rPr lang="en-US" i="1">
+                                <a:latin typeface="Cambria Math" panose="02040503050406030204" pitchFamily="18" charset="0"/>
+                              </a:rPr>
                               <m:t>𝑛</m:t>
                             </m:r>
                             <m:r>
-                              <a:rPr lang="en-US" i="1"/>
+                              <a:rPr lang="en-US" i="1">
+                                <a:latin typeface="Cambria Math" panose="02040503050406030204" pitchFamily="18" charset="0"/>
+                              </a:rPr>
                               <m:t>,</m:t>
                             </m:r>
                             <m:r>
-                              <a:rPr lang="en-US" i="1"/>
+                              <a:rPr lang="en-US" i="1">
+                                <a:latin typeface="Cambria Math" panose="02040503050406030204" pitchFamily="18" charset="0"/>
+                              </a:rPr>
                               <m:t>𝑃</m:t>
                             </m:r>
                           </m:e>
@@ -18619,14 +18792,10 @@
                 <a:endParaRPr lang="en-US" dirty="0"/>
               </a:p>
               <a:p>
-                <a:pPr lvl="1"/>
-                <a:endParaRPr lang="en-US" dirty="0"/>
-              </a:p>
-              <a:p>
-                <a:pPr marL="457200" lvl="1" indent="0">
-                  <a:buNone/>
-                </a:pPr>
-                <a:endParaRPr lang="en-US" dirty="0"/>
+                <a:r>
+                  <a:rPr lang="en-US" dirty="0"/>
+                  <a:t>At each step all processors count the frequencies of the candidate itemset in their section.</a:t>
+                </a:r>
               </a:p>
             </p:txBody>
           </p:sp>
@@ -18686,13 +18855,13 @@
           <p:nvPr>
             <p:extLst>
               <p:ext uri="{D42A27DB-BD31-4B8C-83A1-F6EECF244321}">
-                <p14:modId xmlns:p14="http://schemas.microsoft.com/office/powerpoint/2010/main" val="3687074080"/>
+                <p14:modId xmlns:p14="http://schemas.microsoft.com/office/powerpoint/2010/main" val="1410667495"/>
               </p:ext>
             </p:extLst>
           </p:nvPr>
         </p:nvGraphicFramePr>
         <p:xfrm>
-          <a:off x="3946418" y="4483282"/>
+          <a:off x="4940329" y="4793271"/>
           <a:ext cx="1155671" cy="1478280"/>
         </p:xfrm>
         <a:graphic>
@@ -18808,7 +18977,7 @@
         </p:nvSpPr>
         <p:spPr>
           <a:xfrm>
-            <a:off x="3507623" y="4651033"/>
+            <a:off x="4501534" y="4961022"/>
             <a:ext cx="438795" cy="369332"/>
           </a:xfrm>
           <a:prstGeom prst="rect">
@@ -18843,7 +19012,7 @@
         </p:nvSpPr>
         <p:spPr>
           <a:xfrm>
-            <a:off x="3507623" y="5324978"/>
+            <a:off x="4501534" y="5634967"/>
             <a:ext cx="438795" cy="369332"/>
           </a:xfrm>
           <a:prstGeom prst="rect">
@@ -18880,7 +19049,7 @@
         </p:nvCxnSpPr>
         <p:spPr>
           <a:xfrm flipH="1">
-            <a:off x="3507624" y="5222422"/>
+            <a:off x="4501535" y="5532411"/>
             <a:ext cx="1594465" cy="0"/>
           </a:xfrm>
           <a:prstGeom prst="line">
@@ -20576,7 +20745,7 @@
           <a:p>
             <a:r>
               <a:rPr lang="en-US" sz="1600" dirty="0"/>
-              <a:t>** 12 times duplication of DS1</a:t>
+              <a:t>** Linear expansion by 12 of DS1</a:t>
             </a:r>
           </a:p>
         </p:txBody>

</xml_diff>